<commit_message>
Přidáno děkujeme za pozornost do semestránlí prezentace
</commit_message>
<xml_diff>
--- a/source/files/prezentace_sem.pptx
+++ b/source/files/prezentace_sem.pptx
@@ -39,24 +39,24 @@
     <p:sldId id="288" r:id="rId33"/>
     <p:sldId id="286" r:id="rId34"/>
     <p:sldId id="287" r:id="rId35"/>
-    <p:sldId id="289" r:id="rId36"/>
-    <p:sldId id="302" r:id="rId37"/>
-    <p:sldId id="303" r:id="rId38"/>
-    <p:sldId id="304" r:id="rId39"/>
-    <p:sldId id="305" r:id="rId40"/>
-    <p:sldId id="306" r:id="rId41"/>
-    <p:sldId id="307" r:id="rId42"/>
-    <p:sldId id="301" r:id="rId43"/>
-    <p:sldId id="299" r:id="rId44"/>
-    <p:sldId id="291" r:id="rId45"/>
-    <p:sldId id="292" r:id="rId46"/>
-    <p:sldId id="293" r:id="rId47"/>
-    <p:sldId id="294" r:id="rId48"/>
-    <p:sldId id="295" r:id="rId49"/>
-    <p:sldId id="296" r:id="rId50"/>
-    <p:sldId id="297" r:id="rId51"/>
-    <p:sldId id="298" r:id="rId52"/>
-    <p:sldId id="290" r:id="rId53"/>
+    <p:sldId id="302" r:id="rId36"/>
+    <p:sldId id="303" r:id="rId37"/>
+    <p:sldId id="304" r:id="rId38"/>
+    <p:sldId id="305" r:id="rId39"/>
+    <p:sldId id="306" r:id="rId40"/>
+    <p:sldId id="307" r:id="rId41"/>
+    <p:sldId id="301" r:id="rId42"/>
+    <p:sldId id="299" r:id="rId43"/>
+    <p:sldId id="291" r:id="rId44"/>
+    <p:sldId id="292" r:id="rId45"/>
+    <p:sldId id="293" r:id="rId46"/>
+    <p:sldId id="294" r:id="rId47"/>
+    <p:sldId id="295" r:id="rId48"/>
+    <p:sldId id="296" r:id="rId49"/>
+    <p:sldId id="297" r:id="rId50"/>
+    <p:sldId id="298" r:id="rId51"/>
+    <p:sldId id="290" r:id="rId52"/>
+    <p:sldId id="308" r:id="rId53"/>
   </p:sldIdLst>
   <p:sldSz cx="9144000" cy="6858000" type="screen4x3"/>
   <p:notesSz cx="6858000" cy="9144000"/>
@@ -11676,77 +11676,12 @@
               <a:t>založen na agility</a:t>
             </a:r>
           </a:p>
-          <a:p>
-            <a:pPr algn="ctr"/>
-            <a:r>
-              <a:rPr lang="en-CZ" sz="2400" dirty="0">
-                <a:solidFill>
-                  <a:srgbClr val="0065BD"/>
-                </a:solidFill>
-                <a:latin typeface="Times New Roman" panose="02020603050405020304" pitchFamily="18" charset="0"/>
-                <a:cs typeface="Times New Roman" panose="02020603050405020304" pitchFamily="18" charset="0"/>
-              </a:rPr>
-              <a:t>přístup agility vytvořen z důvodu problémů ve vývoji SW</a:t>
-            </a:r>
-          </a:p>
-          <a:p>
-            <a:pPr algn="ctr"/>
-            <a:r>
-              <a:rPr lang="en-CZ" sz="2400" dirty="0">
-                <a:solidFill>
-                  <a:srgbClr val="0065BD"/>
-                </a:solidFill>
-                <a:latin typeface="Times New Roman" panose="02020603050405020304" pitchFamily="18" charset="0"/>
-                <a:cs typeface="Times New Roman" panose="02020603050405020304" pitchFamily="18" charset="0"/>
-              </a:rPr>
-              <a:t>iterační princip</a:t>
-            </a:r>
-          </a:p>
-          <a:p>
-            <a:pPr algn="ctr"/>
-            <a:r>
-              <a:rPr lang="en-CZ" sz="2400" dirty="0">
-                <a:solidFill>
-                  <a:srgbClr val="0065BD"/>
-                </a:solidFill>
-                <a:latin typeface="Times New Roman" panose="02020603050405020304" pitchFamily="18" charset="0"/>
-                <a:cs typeface="Times New Roman" panose="02020603050405020304" pitchFamily="18" charset="0"/>
-              </a:rPr>
-              <a:t>vytvoření Manifesto for Agile Software Development</a:t>
-            </a:r>
-          </a:p>
-          <a:p>
-            <a:pPr algn="ctr"/>
-            <a:r>
-              <a:rPr lang="en-CZ" sz="2400" dirty="0">
-                <a:solidFill>
-                  <a:srgbClr val="0065BD"/>
-                </a:solidFill>
-                <a:latin typeface="Times New Roman" panose="02020603050405020304" pitchFamily="18" charset="0"/>
-                <a:cs typeface="Times New Roman" panose="02020603050405020304" pitchFamily="18" charset="0"/>
-              </a:rPr>
-              <a:t>principy Manifesto přeformulovány ze SW do manufacturing</a:t>
-            </a:r>
-          </a:p>
-          <a:p>
-            <a:pPr algn="ctr"/>
-            <a:r>
-              <a:rPr lang="en-CZ" sz="2400" dirty="0">
-                <a:solidFill>
-                  <a:srgbClr val="0065BD"/>
-                </a:solidFill>
-                <a:latin typeface="Times New Roman" panose="02020603050405020304" pitchFamily="18" charset="0"/>
-                <a:cs typeface="Times New Roman" panose="02020603050405020304" pitchFamily="18" charset="0"/>
-              </a:rPr>
-              <a:t>základy ze Scrum</a:t>
-            </a:r>
-          </a:p>
         </p:txBody>
       </p:sp>
     </p:spTree>
     <p:extLst>
       <p:ext uri="{BB962C8B-B14F-4D97-AF65-F5344CB8AC3E}">
-        <p14:creationId xmlns:p14="http://schemas.microsoft.com/office/powerpoint/2010/main" val="1598922453"/>
+        <p14:creationId xmlns:p14="http://schemas.microsoft.com/office/powerpoint/2010/main" val="2220901875"/>
       </p:ext>
     </p:extLst>
   </p:cSld>
@@ -12067,13 +12002,23 @@
             <a:pPr algn="ctr"/>
             <a:r>
               <a:rPr lang="en-CZ" sz="2400" dirty="0">
+                <a:latin typeface="Times New Roman" panose="02020603050405020304" pitchFamily="18" charset="0"/>
+                <a:cs typeface="Times New Roman" panose="02020603050405020304" pitchFamily="18" charset="0"/>
+              </a:rPr>
+              <a:t>založen na agility</a:t>
+            </a:r>
+          </a:p>
+          <a:p>
+            <a:pPr algn="ctr"/>
+            <a:r>
+              <a:rPr lang="en-CZ" sz="2400" dirty="0">
                 <a:solidFill>
                   <a:srgbClr val="0065BD"/>
                 </a:solidFill>
                 <a:latin typeface="Times New Roman" panose="02020603050405020304" pitchFamily="18" charset="0"/>
                 <a:cs typeface="Times New Roman" panose="02020603050405020304" pitchFamily="18" charset="0"/>
               </a:rPr>
-              <a:t>založen na agility</a:t>
+              <a:t>přístup agility vytvořen z důvodu problémů ve vývoji SW</a:t>
             </a:r>
           </a:p>
         </p:txBody>
@@ -12081,7 +12026,7 @@
     </p:spTree>
     <p:extLst>
       <p:ext uri="{BB962C8B-B14F-4D97-AF65-F5344CB8AC3E}">
-        <p14:creationId xmlns:p14="http://schemas.microsoft.com/office/powerpoint/2010/main" val="2220901875"/>
+        <p14:creationId xmlns:p14="http://schemas.microsoft.com/office/powerpoint/2010/main" val="4222871393"/>
       </p:ext>
     </p:extLst>
   </p:cSld>
@@ -12412,13 +12357,23 @@
             <a:pPr algn="ctr"/>
             <a:r>
               <a:rPr lang="en-CZ" sz="2400" dirty="0">
+                <a:latin typeface="Times New Roman" panose="02020603050405020304" pitchFamily="18" charset="0"/>
+                <a:cs typeface="Times New Roman" panose="02020603050405020304" pitchFamily="18" charset="0"/>
+              </a:rPr>
+              <a:t>přístup agility vytvořen z důvodu problémů ve vývoji SW</a:t>
+            </a:r>
+          </a:p>
+          <a:p>
+            <a:pPr algn="ctr"/>
+            <a:r>
+              <a:rPr lang="en-CZ" sz="2400" dirty="0">
                 <a:solidFill>
                   <a:srgbClr val="0065BD"/>
                 </a:solidFill>
                 <a:latin typeface="Times New Roman" panose="02020603050405020304" pitchFamily="18" charset="0"/>
                 <a:cs typeface="Times New Roman" panose="02020603050405020304" pitchFamily="18" charset="0"/>
               </a:rPr>
-              <a:t>přístup agility vytvořen z důvodu problémů ve vývoji SW</a:t>
+              <a:t>iterační princip</a:t>
             </a:r>
           </a:p>
         </p:txBody>
@@ -12426,7 +12381,7 @@
     </p:spTree>
     <p:extLst>
       <p:ext uri="{BB962C8B-B14F-4D97-AF65-F5344CB8AC3E}">
-        <p14:creationId xmlns:p14="http://schemas.microsoft.com/office/powerpoint/2010/main" val="4222871393"/>
+        <p14:creationId xmlns:p14="http://schemas.microsoft.com/office/powerpoint/2010/main" val="3275247148"/>
       </p:ext>
     </p:extLst>
   </p:cSld>
@@ -12767,13 +12722,23 @@
             <a:pPr algn="ctr"/>
             <a:r>
               <a:rPr lang="en-CZ" sz="2400" dirty="0">
+                <a:latin typeface="Times New Roman" panose="02020603050405020304" pitchFamily="18" charset="0"/>
+                <a:cs typeface="Times New Roman" panose="02020603050405020304" pitchFamily="18" charset="0"/>
+              </a:rPr>
+              <a:t>iterační princip</a:t>
+            </a:r>
+          </a:p>
+          <a:p>
+            <a:pPr algn="ctr"/>
+            <a:r>
+              <a:rPr lang="en-CZ" sz="2400" dirty="0">
                 <a:solidFill>
                   <a:srgbClr val="0065BD"/>
                 </a:solidFill>
                 <a:latin typeface="Times New Roman" panose="02020603050405020304" pitchFamily="18" charset="0"/>
                 <a:cs typeface="Times New Roman" panose="02020603050405020304" pitchFamily="18" charset="0"/>
               </a:rPr>
-              <a:t>iterační princip</a:t>
+              <a:t>vytvoření Manifesto for Agile Software Development</a:t>
             </a:r>
           </a:p>
         </p:txBody>
@@ -12781,7 +12746,7 @@
     </p:spTree>
     <p:extLst>
       <p:ext uri="{BB962C8B-B14F-4D97-AF65-F5344CB8AC3E}">
-        <p14:creationId xmlns:p14="http://schemas.microsoft.com/office/powerpoint/2010/main" val="3275247148"/>
+        <p14:creationId xmlns:p14="http://schemas.microsoft.com/office/powerpoint/2010/main" val="3745765733"/>
       </p:ext>
     </p:extLst>
   </p:cSld>
@@ -13132,13 +13097,23 @@
             <a:pPr algn="ctr"/>
             <a:r>
               <a:rPr lang="en-CZ" sz="2400" dirty="0">
+                <a:latin typeface="Times New Roman" panose="02020603050405020304" pitchFamily="18" charset="0"/>
+                <a:cs typeface="Times New Roman" panose="02020603050405020304" pitchFamily="18" charset="0"/>
+              </a:rPr>
+              <a:t>vytvoření Manifesto for Agile Software Development</a:t>
+            </a:r>
+          </a:p>
+          <a:p>
+            <a:pPr algn="ctr"/>
+            <a:r>
+              <a:rPr lang="en-CZ" sz="2400" dirty="0">
                 <a:solidFill>
                   <a:srgbClr val="0065BD"/>
                 </a:solidFill>
                 <a:latin typeface="Times New Roman" panose="02020603050405020304" pitchFamily="18" charset="0"/>
                 <a:cs typeface="Times New Roman" panose="02020603050405020304" pitchFamily="18" charset="0"/>
               </a:rPr>
-              <a:t>vytvoření Manifesto for Agile Software Development</a:t>
+              <a:t>principy Manifesto přeformulovány ze SW do manufacturing</a:t>
             </a:r>
           </a:p>
         </p:txBody>
@@ -13146,7 +13121,7 @@
     </p:spTree>
     <p:extLst>
       <p:ext uri="{BB962C8B-B14F-4D97-AF65-F5344CB8AC3E}">
-        <p14:creationId xmlns:p14="http://schemas.microsoft.com/office/powerpoint/2010/main" val="3745765733"/>
+        <p14:creationId xmlns:p14="http://schemas.microsoft.com/office/powerpoint/2010/main" val="1425864915"/>
       </p:ext>
     </p:extLst>
   </p:cSld>
@@ -13711,13 +13686,23 @@
             <a:pPr algn="ctr"/>
             <a:r>
               <a:rPr lang="en-CZ" sz="2400" dirty="0">
+                <a:latin typeface="Times New Roman" panose="02020603050405020304" pitchFamily="18" charset="0"/>
+                <a:cs typeface="Times New Roman" panose="02020603050405020304" pitchFamily="18" charset="0"/>
+              </a:rPr>
+              <a:t>principy Manifesto přeformulovány ze SW do manufacturing</a:t>
+            </a:r>
+          </a:p>
+          <a:p>
+            <a:pPr algn="ctr"/>
+            <a:r>
+              <a:rPr lang="en-CZ" sz="2400" dirty="0">
                 <a:solidFill>
                   <a:srgbClr val="0065BD"/>
                 </a:solidFill>
                 <a:latin typeface="Times New Roman" panose="02020603050405020304" pitchFamily="18" charset="0"/>
                 <a:cs typeface="Times New Roman" panose="02020603050405020304" pitchFamily="18" charset="0"/>
               </a:rPr>
-              <a:t>principy Manifesto přeformulovány ze SW do manufacturing</a:t>
+              <a:t>základy ze Scrum</a:t>
             </a:r>
           </a:p>
         </p:txBody>
@@ -13725,7 +13710,7 @@
     </p:spTree>
     <p:extLst>
       <p:ext uri="{BB962C8B-B14F-4D97-AF65-F5344CB8AC3E}">
-        <p14:creationId xmlns:p14="http://schemas.microsoft.com/office/powerpoint/2010/main" val="1425864915"/>
+        <p14:creationId xmlns:p14="http://schemas.microsoft.com/office/powerpoint/2010/main" val="2511102984"/>
       </p:ext>
     </p:extLst>
   </p:cSld>
@@ -13843,7 +13828,7 @@
                 <a:latin typeface="+mj-lt"/>
                 <a:cs typeface="Times New Roman" panose="02020603050405020304" pitchFamily="18" charset="0"/>
               </a:rPr>
-              <a:t>XM</a:t>
+              <a:t>Základy ze Scrum</a:t>
             </a:r>
             <a:endParaRPr lang="en-CZ" sz="2800" dirty="0">
               <a:latin typeface="+mj-lt"/>
@@ -14046,63 +14031,13 @@
             <a:pPr algn="ctr"/>
             <a:r>
               <a:rPr lang="en-CZ" sz="2400" dirty="0">
-                <a:latin typeface="Times New Roman" panose="02020603050405020304" pitchFamily="18" charset="0"/>
-                <a:cs typeface="Times New Roman" panose="02020603050405020304" pitchFamily="18" charset="0"/>
-              </a:rPr>
-              <a:t>založen na agility</a:t>
-            </a:r>
-          </a:p>
-          <a:p>
-            <a:pPr algn="ctr"/>
-            <a:r>
-              <a:rPr lang="en-CZ" sz="2400" dirty="0">
-                <a:latin typeface="Times New Roman" panose="02020603050405020304" pitchFamily="18" charset="0"/>
-                <a:cs typeface="Times New Roman" panose="02020603050405020304" pitchFamily="18" charset="0"/>
-              </a:rPr>
-              <a:t>přístup agility vytvořen z důvodu problémů ve vývoji SW</a:t>
-            </a:r>
-          </a:p>
-          <a:p>
-            <a:pPr algn="ctr"/>
-            <a:r>
-              <a:rPr lang="en-CZ" sz="2400" dirty="0">
-                <a:latin typeface="Times New Roman" panose="02020603050405020304" pitchFamily="18" charset="0"/>
-                <a:cs typeface="Times New Roman" panose="02020603050405020304" pitchFamily="18" charset="0"/>
-              </a:rPr>
-              <a:t>iterační princip</a:t>
-            </a:r>
-          </a:p>
-          <a:p>
-            <a:pPr algn="ctr"/>
-            <a:r>
-              <a:rPr lang="en-CZ" sz="2400" dirty="0">
-                <a:latin typeface="Times New Roman" panose="02020603050405020304" pitchFamily="18" charset="0"/>
-                <a:cs typeface="Times New Roman" panose="02020603050405020304" pitchFamily="18" charset="0"/>
-              </a:rPr>
-              <a:t>vytvoření Manifesto for Agile Software Development</a:t>
-            </a:r>
-          </a:p>
-          <a:p>
-            <a:pPr algn="ctr"/>
-            <a:r>
-              <a:rPr lang="en-CZ" sz="2400" dirty="0">
-                <a:latin typeface="Times New Roman" panose="02020603050405020304" pitchFamily="18" charset="0"/>
-                <a:cs typeface="Times New Roman" panose="02020603050405020304" pitchFamily="18" charset="0"/>
-              </a:rPr>
-              <a:t>principy Manifesto přeformulovány ze SW do manufacturing</a:t>
-            </a:r>
-          </a:p>
-          <a:p>
-            <a:pPr algn="ctr"/>
-            <a:r>
-              <a:rPr lang="en-CZ" sz="2400" dirty="0">
                 <a:solidFill>
                   <a:srgbClr val="0065BD"/>
                 </a:solidFill>
                 <a:latin typeface="Times New Roman" panose="02020603050405020304" pitchFamily="18" charset="0"/>
                 <a:cs typeface="Times New Roman" panose="02020603050405020304" pitchFamily="18" charset="0"/>
               </a:rPr>
-              <a:t>základy ze Scrum</a:t>
+              <a:t>Optimizováno pro změnu</a:t>
             </a:r>
           </a:p>
         </p:txBody>
@@ -14110,7 +14045,7 @@
     </p:spTree>
     <p:extLst>
       <p:ext uri="{BB962C8B-B14F-4D97-AF65-F5344CB8AC3E}">
-        <p14:creationId xmlns:p14="http://schemas.microsoft.com/office/powerpoint/2010/main" val="2511102984"/>
+        <p14:creationId xmlns:p14="http://schemas.microsoft.com/office/powerpoint/2010/main" val="3447380460"/>
       </p:ext>
     </p:extLst>
   </p:cSld>
@@ -14431,21 +14366,38 @@
             <a:pPr algn="ctr"/>
             <a:r>
               <a:rPr lang="en-CZ" sz="2400" dirty="0">
+                <a:latin typeface="Times New Roman" panose="02020603050405020304" pitchFamily="18" charset="0"/>
+                <a:cs typeface="Times New Roman" panose="02020603050405020304" pitchFamily="18" charset="0"/>
+              </a:rPr>
+              <a:t>Optimizováno pro změnu</a:t>
+            </a:r>
+          </a:p>
+          <a:p>
+            <a:pPr algn="ctr"/>
+            <a:r>
+              <a:rPr lang="en-CZ" sz="2400" dirty="0">
                 <a:solidFill>
                   <a:srgbClr val="0065BD"/>
                 </a:solidFill>
                 <a:latin typeface="Times New Roman" panose="02020603050405020304" pitchFamily="18" charset="0"/>
                 <a:cs typeface="Times New Roman" panose="02020603050405020304" pitchFamily="18" charset="0"/>
               </a:rPr>
-              <a:t>Optimizováno pro změnu</a:t>
-            </a:r>
+              <a:t>Objektivně orientované, modulární architektura</a:t>
+            </a:r>
+          </a:p>
+          <a:p>
+            <a:pPr algn="ctr"/>
+            <a:endParaRPr lang="en-CZ" sz="2400" dirty="0">
+              <a:latin typeface="Times New Roman" panose="02020603050405020304" pitchFamily="18" charset="0"/>
+              <a:cs typeface="Times New Roman" panose="02020603050405020304" pitchFamily="18" charset="0"/>
+            </a:endParaRPr>
           </a:p>
         </p:txBody>
       </p:sp>
     </p:spTree>
     <p:extLst>
       <p:ext uri="{BB962C8B-B14F-4D97-AF65-F5344CB8AC3E}">
-        <p14:creationId xmlns:p14="http://schemas.microsoft.com/office/powerpoint/2010/main" val="3447380460"/>
+        <p14:creationId xmlns:p14="http://schemas.microsoft.com/office/powerpoint/2010/main" val="980812500"/>
       </p:ext>
     </p:extLst>
   </p:cSld>
@@ -14776,13 +14728,23 @@
             <a:pPr algn="ctr"/>
             <a:r>
               <a:rPr lang="en-CZ" sz="2400" dirty="0">
+                <a:latin typeface="Times New Roman" panose="02020603050405020304" pitchFamily="18" charset="0"/>
+                <a:cs typeface="Times New Roman" panose="02020603050405020304" pitchFamily="18" charset="0"/>
+              </a:rPr>
+              <a:t>Objektivně orientované, modulární architektura</a:t>
+            </a:r>
+          </a:p>
+          <a:p>
+            <a:pPr algn="ctr"/>
+            <a:r>
+              <a:rPr lang="en-CZ" sz="2400" dirty="0">
                 <a:solidFill>
                   <a:srgbClr val="0065BD"/>
                 </a:solidFill>
                 <a:latin typeface="Times New Roman" panose="02020603050405020304" pitchFamily="18" charset="0"/>
                 <a:cs typeface="Times New Roman" panose="02020603050405020304" pitchFamily="18" charset="0"/>
               </a:rPr>
-              <a:t>Objektivně orientované, modulární architektura</a:t>
+              <a:t>Test Driven Development</a:t>
             </a:r>
           </a:p>
           <a:p>
@@ -14797,7 +14759,7 @@
     </p:spTree>
     <p:extLst>
       <p:ext uri="{BB962C8B-B14F-4D97-AF65-F5344CB8AC3E}">
-        <p14:creationId xmlns:p14="http://schemas.microsoft.com/office/powerpoint/2010/main" val="980812500"/>
+        <p14:creationId xmlns:p14="http://schemas.microsoft.com/office/powerpoint/2010/main" val="2262498160"/>
       </p:ext>
     </p:extLst>
   </p:cSld>
@@ -15138,13 +15100,23 @@
             <a:pPr algn="ctr"/>
             <a:r>
               <a:rPr lang="en-CZ" sz="2400" dirty="0">
+                <a:latin typeface="Times New Roman" panose="02020603050405020304" pitchFamily="18" charset="0"/>
+                <a:cs typeface="Times New Roman" panose="02020603050405020304" pitchFamily="18" charset="0"/>
+              </a:rPr>
+              <a:t>Test Driven Development</a:t>
+            </a:r>
+          </a:p>
+          <a:p>
+            <a:pPr algn="ctr"/>
+            <a:r>
+              <a:rPr lang="en-CZ" sz="2400" dirty="0">
                 <a:solidFill>
                   <a:srgbClr val="0065BD"/>
                 </a:solidFill>
                 <a:latin typeface="Times New Roman" panose="02020603050405020304" pitchFamily="18" charset="0"/>
                 <a:cs typeface="Times New Roman" panose="02020603050405020304" pitchFamily="18" charset="0"/>
               </a:rPr>
-              <a:t>Test Driven Development</a:t>
+              <a:t>Contact First Design</a:t>
             </a:r>
           </a:p>
           <a:p>
@@ -15159,7 +15131,7 @@
     </p:spTree>
     <p:extLst>
       <p:ext uri="{BB962C8B-B14F-4D97-AF65-F5344CB8AC3E}">
-        <p14:creationId xmlns:p14="http://schemas.microsoft.com/office/powerpoint/2010/main" val="2262498160"/>
+        <p14:creationId xmlns:p14="http://schemas.microsoft.com/office/powerpoint/2010/main" val="829010547"/>
       </p:ext>
     </p:extLst>
   </p:cSld>
@@ -15510,13 +15482,23 @@
             <a:pPr algn="ctr"/>
             <a:r>
               <a:rPr lang="en-CZ" sz="2400" dirty="0">
+                <a:latin typeface="Times New Roman" panose="02020603050405020304" pitchFamily="18" charset="0"/>
+                <a:cs typeface="Times New Roman" panose="02020603050405020304" pitchFamily="18" charset="0"/>
+              </a:rPr>
+              <a:t>Contact First Design</a:t>
+            </a:r>
+          </a:p>
+          <a:p>
+            <a:pPr algn="ctr"/>
+            <a:r>
+              <a:rPr lang="en-CZ" sz="2400" dirty="0">
                 <a:solidFill>
                   <a:srgbClr val="0065BD"/>
                 </a:solidFill>
                 <a:latin typeface="Times New Roman" panose="02020603050405020304" pitchFamily="18" charset="0"/>
                 <a:cs typeface="Times New Roman" panose="02020603050405020304" pitchFamily="18" charset="0"/>
               </a:rPr>
-              <a:t>Contact First Design</a:t>
+              <a:t>Iterate the Design</a:t>
             </a:r>
           </a:p>
           <a:p>
@@ -15531,7 +15513,7 @@
     </p:spTree>
     <p:extLst>
       <p:ext uri="{BB962C8B-B14F-4D97-AF65-F5344CB8AC3E}">
-        <p14:creationId xmlns:p14="http://schemas.microsoft.com/office/powerpoint/2010/main" val="829010547"/>
+        <p14:creationId xmlns:p14="http://schemas.microsoft.com/office/powerpoint/2010/main" val="437437047"/>
       </p:ext>
     </p:extLst>
   </p:cSld>
@@ -15892,13 +15874,23 @@
             <a:pPr algn="ctr"/>
             <a:r>
               <a:rPr lang="en-CZ" sz="2400" dirty="0">
+                <a:latin typeface="Times New Roman" panose="02020603050405020304" pitchFamily="18" charset="0"/>
+                <a:cs typeface="Times New Roman" panose="02020603050405020304" pitchFamily="18" charset="0"/>
+              </a:rPr>
+              <a:t>Iterate the Design</a:t>
+            </a:r>
+          </a:p>
+          <a:p>
+            <a:pPr algn="ctr"/>
+            <a:r>
+              <a:rPr lang="en-CZ" sz="2400" dirty="0">
                 <a:solidFill>
                   <a:srgbClr val="0065BD"/>
                 </a:solidFill>
                 <a:latin typeface="Times New Roman" panose="02020603050405020304" pitchFamily="18" charset="0"/>
                 <a:cs typeface="Times New Roman" panose="02020603050405020304" pitchFamily="18" charset="0"/>
               </a:rPr>
-              <a:t>Iterate the Design</a:t>
+              <a:t>Agile Hardware Design Patterns</a:t>
             </a:r>
           </a:p>
           <a:p>
@@ -15913,7 +15905,7 @@
     </p:spTree>
     <p:extLst>
       <p:ext uri="{BB962C8B-B14F-4D97-AF65-F5344CB8AC3E}">
-        <p14:creationId xmlns:p14="http://schemas.microsoft.com/office/powerpoint/2010/main" val="437437047"/>
+        <p14:creationId xmlns:p14="http://schemas.microsoft.com/office/powerpoint/2010/main" val="2965370288"/>
       </p:ext>
     </p:extLst>
   </p:cSld>
@@ -16284,28 +16276,31 @@
             <a:pPr algn="ctr"/>
             <a:r>
               <a:rPr lang="en-CZ" sz="2400" dirty="0">
+                <a:latin typeface="Times New Roman" panose="02020603050405020304" pitchFamily="18" charset="0"/>
+                <a:cs typeface="Times New Roman" panose="02020603050405020304" pitchFamily="18" charset="0"/>
+              </a:rPr>
+              <a:t>Agile Hardware Design Patterns</a:t>
+            </a:r>
+          </a:p>
+          <a:p>
+            <a:pPr algn="ctr"/>
+            <a:r>
+              <a:rPr lang="en-CZ" sz="2400" dirty="0">
                 <a:solidFill>
                   <a:srgbClr val="0065BD"/>
                 </a:solidFill>
                 <a:latin typeface="Times New Roman" panose="02020603050405020304" pitchFamily="18" charset="0"/>
                 <a:cs typeface="Times New Roman" panose="02020603050405020304" pitchFamily="18" charset="0"/>
               </a:rPr>
-              <a:t>Agile Hardware Design Patterns</a:t>
-            </a:r>
-          </a:p>
-          <a:p>
-            <a:pPr algn="ctr"/>
-            <a:endParaRPr lang="en-CZ" sz="2400" dirty="0">
-              <a:latin typeface="Times New Roman" panose="02020603050405020304" pitchFamily="18" charset="0"/>
-              <a:cs typeface="Times New Roman" panose="02020603050405020304" pitchFamily="18" charset="0"/>
-            </a:endParaRPr>
+              <a:t>Continuous Integration Development</a:t>
+            </a:r>
           </a:p>
         </p:txBody>
       </p:sp>
     </p:spTree>
     <p:extLst>
       <p:ext uri="{BB962C8B-B14F-4D97-AF65-F5344CB8AC3E}">
-        <p14:creationId xmlns:p14="http://schemas.microsoft.com/office/powerpoint/2010/main" val="2965370288"/>
+        <p14:creationId xmlns:p14="http://schemas.microsoft.com/office/powerpoint/2010/main" val="1168832104"/>
       </p:ext>
     </p:extLst>
   </p:cSld>
@@ -16686,13 +16681,23 @@
             <a:pPr algn="ctr"/>
             <a:r>
               <a:rPr lang="en-CZ" sz="2400" dirty="0">
+                <a:latin typeface="Times New Roman" panose="02020603050405020304" pitchFamily="18" charset="0"/>
+                <a:cs typeface="Times New Roman" panose="02020603050405020304" pitchFamily="18" charset="0"/>
+              </a:rPr>
+              <a:t>Continuous Integration Development</a:t>
+            </a:r>
+          </a:p>
+          <a:p>
+            <a:pPr algn="ctr"/>
+            <a:r>
+              <a:rPr lang="en-CZ" sz="2400" dirty="0">
                 <a:solidFill>
                   <a:srgbClr val="0065BD"/>
                 </a:solidFill>
                 <a:latin typeface="Times New Roman" panose="02020603050405020304" pitchFamily="18" charset="0"/>
                 <a:cs typeface="Times New Roman" panose="02020603050405020304" pitchFamily="18" charset="0"/>
               </a:rPr>
-              <a:t>Continuous Integration Development</a:t>
+              <a:t>Continuous Deployment Development</a:t>
             </a:r>
           </a:p>
         </p:txBody>
@@ -16700,7 +16705,7 @@
     </p:spTree>
     <p:extLst>
       <p:ext uri="{BB962C8B-B14F-4D97-AF65-F5344CB8AC3E}">
-        <p14:creationId xmlns:p14="http://schemas.microsoft.com/office/powerpoint/2010/main" val="1168832104"/>
+        <p14:creationId xmlns:p14="http://schemas.microsoft.com/office/powerpoint/2010/main" val="3315965749"/>
       </p:ext>
     </p:extLst>
   </p:cSld>
@@ -17091,13 +17096,23 @@
             <a:pPr algn="ctr"/>
             <a:r>
               <a:rPr lang="en-CZ" sz="2400" dirty="0">
+                <a:latin typeface="Times New Roman" panose="02020603050405020304" pitchFamily="18" charset="0"/>
+                <a:cs typeface="Times New Roman" panose="02020603050405020304" pitchFamily="18" charset="0"/>
+              </a:rPr>
+              <a:t>Continuous Deployment Development</a:t>
+            </a:r>
+          </a:p>
+          <a:p>
+            <a:pPr algn="ctr"/>
+            <a:r>
+              <a:rPr lang="en-CZ" sz="2400" dirty="0">
                 <a:solidFill>
                   <a:srgbClr val="0065BD"/>
                 </a:solidFill>
                 <a:latin typeface="Times New Roman" panose="02020603050405020304" pitchFamily="18" charset="0"/>
                 <a:cs typeface="Times New Roman" panose="02020603050405020304" pitchFamily="18" charset="0"/>
               </a:rPr>
-              <a:t>Continuous Deployment Development</a:t>
+              <a:t>Scaling Patterns</a:t>
             </a:r>
           </a:p>
         </p:txBody>
@@ -17105,7 +17120,7 @@
     </p:spTree>
     <p:extLst>
       <p:ext uri="{BB962C8B-B14F-4D97-AF65-F5344CB8AC3E}">
-        <p14:creationId xmlns:p14="http://schemas.microsoft.com/office/powerpoint/2010/main" val="3315965749"/>
+        <p14:creationId xmlns:p14="http://schemas.microsoft.com/office/powerpoint/2010/main" val="174182631"/>
       </p:ext>
     </p:extLst>
   </p:cSld>
@@ -17842,13 +17857,23 @@
             <a:pPr algn="ctr"/>
             <a:r>
               <a:rPr lang="en-CZ" sz="2400" dirty="0">
+                <a:latin typeface="Times New Roman" panose="02020603050405020304" pitchFamily="18" charset="0"/>
+                <a:cs typeface="Times New Roman" panose="02020603050405020304" pitchFamily="18" charset="0"/>
+              </a:rPr>
+              <a:t>Scaling Patterns</a:t>
+            </a:r>
+          </a:p>
+          <a:p>
+            <a:pPr algn="ctr"/>
+            <a:r>
+              <a:rPr lang="en-CZ" sz="2400" dirty="0">
                 <a:solidFill>
                   <a:srgbClr val="0065BD"/>
                 </a:solidFill>
                 <a:latin typeface="Times New Roman" panose="02020603050405020304" pitchFamily="18" charset="0"/>
                 <a:cs typeface="Times New Roman" panose="02020603050405020304" pitchFamily="18" charset="0"/>
               </a:rPr>
-              <a:t>Scaling Patterns</a:t>
+              <a:t>Partner Patterns</a:t>
             </a:r>
           </a:p>
         </p:txBody>
@@ -17856,7 +17881,7 @@
     </p:spTree>
     <p:extLst>
       <p:ext uri="{BB962C8B-B14F-4D97-AF65-F5344CB8AC3E}">
-        <p14:creationId xmlns:p14="http://schemas.microsoft.com/office/powerpoint/2010/main" val="174182631"/>
+        <p14:creationId xmlns:p14="http://schemas.microsoft.com/office/powerpoint/2010/main" val="3905668839"/>
       </p:ext>
     </p:extLst>
   </p:cSld>
@@ -17939,431 +17964,6 @@
       </p:sp>
       <p:sp>
         <p:nvSpPr>
-          <p:cNvPr id="5" name="TextBox 4">
-            <a:extLst>
-              <a:ext uri="{FF2B5EF4-FFF2-40B4-BE49-F238E27FC236}">
-                <a16:creationId xmlns:a16="http://schemas.microsoft.com/office/drawing/2014/main" id="{0B97D00E-39C2-D145-A631-DBA36E45E7E1}"/>
-              </a:ext>
-            </a:extLst>
-          </p:cNvPr>
-          <p:cNvSpPr txBox="1"/>
-          <p:nvPr/>
-        </p:nvSpPr>
-        <p:spPr>
-          <a:xfrm>
-            <a:off x="0" y="1221336"/>
-            <a:ext cx="9144000" cy="523220"/>
-          </a:xfrm>
-          <a:prstGeom prst="rect">
-            <a:avLst/>
-          </a:prstGeom>
-          <a:noFill/>
-        </p:spPr>
-        <p:txBody>
-          <a:bodyPr wrap="square" rtlCol="0">
-            <a:spAutoFit/>
-          </a:bodyPr>
-          <a:lstStyle/>
-          <a:p>
-            <a:pPr algn="ctr"/>
-            <a:r>
-              <a:rPr lang="en-CZ" sz="2800" dirty="0">
-                <a:solidFill>
-                  <a:srgbClr val="FF0000"/>
-                </a:solidFill>
-                <a:latin typeface="+mj-lt"/>
-                <a:cs typeface="Times New Roman" panose="02020603050405020304" pitchFamily="18" charset="0"/>
-              </a:rPr>
-              <a:t>Základy ze Scrum</a:t>
-            </a:r>
-            <a:endParaRPr lang="en-CZ" sz="2800" dirty="0">
-              <a:latin typeface="+mj-lt"/>
-            </a:endParaRPr>
-          </a:p>
-        </p:txBody>
-      </p:sp>
-      <p:sp>
-        <p:nvSpPr>
-          <p:cNvPr id="8" name="Content Placeholder 2">
-            <a:extLst>
-              <a:ext uri="{FF2B5EF4-FFF2-40B4-BE49-F238E27FC236}">
-                <a16:creationId xmlns:a16="http://schemas.microsoft.com/office/drawing/2014/main" id="{1DE13750-9F62-BD48-9589-CF29E926F7C9}"/>
-              </a:ext>
-            </a:extLst>
-          </p:cNvPr>
-          <p:cNvSpPr txBox="1">
-            <a:spLocks/>
-          </p:cNvSpPr>
-          <p:nvPr/>
-        </p:nvSpPr>
-        <p:spPr>
-          <a:xfrm>
-            <a:off x="675000" y="1924161"/>
-            <a:ext cx="7794000" cy="4774813"/>
-          </a:xfrm>
-          <a:prstGeom prst="rect">
-            <a:avLst/>
-          </a:prstGeom>
-        </p:spPr>
-        <p:txBody>
-          <a:bodyPr vert="horz" lIns="91440" tIns="45720" rIns="91440" bIns="45720" rtlCol="0">
-            <a:normAutofit/>
-          </a:bodyPr>
-          <a:lstStyle>
-            <a:lvl1pPr marL="0" indent="0" algn="l" defTabSz="914354" rtl="0" eaLnBrk="1" latinLnBrk="0" hangingPunct="1">
-              <a:lnSpc>
-                <a:spcPct val="90000"/>
-              </a:lnSpc>
-              <a:spcBef>
-                <a:spcPts val="1000"/>
-              </a:spcBef>
-              <a:buFont typeface="Arial" panose="020B0604020202020204" pitchFamily="34" charset="0"/>
-              <a:buNone/>
-              <a:defRPr sz="2000" kern="3000" baseline="0">
-                <a:solidFill>
-                  <a:schemeClr val="tx1"/>
-                </a:solidFill>
-                <a:latin typeface="Technika-Bold" panose="00000600000000000000" pitchFamily="50" charset="-18"/>
-                <a:ea typeface="+mn-ea"/>
-                <a:cs typeface="+mn-cs"/>
-              </a:defRPr>
-            </a:lvl1pPr>
-            <a:lvl2pPr marL="685766" indent="-228589" algn="l" defTabSz="914354" rtl="0" eaLnBrk="1" latinLnBrk="0" hangingPunct="1">
-              <a:lnSpc>
-                <a:spcPct val="90000"/>
-              </a:lnSpc>
-              <a:spcBef>
-                <a:spcPts val="500"/>
-              </a:spcBef>
-              <a:buFont typeface="Arial" panose="020B0604020202020204" pitchFamily="34" charset="0"/>
-              <a:buChar char="•"/>
-              <a:defRPr sz="2400" kern="1200">
-                <a:solidFill>
-                  <a:schemeClr val="tx1"/>
-                </a:solidFill>
-                <a:latin typeface="Technika" panose="00000600000000000000" pitchFamily="50" charset="-18"/>
-                <a:ea typeface="+mn-ea"/>
-                <a:cs typeface="+mn-cs"/>
-              </a:defRPr>
-            </a:lvl2pPr>
-            <a:lvl3pPr marL="1142942" indent="-228589" algn="l" defTabSz="914354" rtl="0" eaLnBrk="1" latinLnBrk="0" hangingPunct="1">
-              <a:lnSpc>
-                <a:spcPct val="90000"/>
-              </a:lnSpc>
-              <a:spcBef>
-                <a:spcPts val="500"/>
-              </a:spcBef>
-              <a:buFont typeface="Arial" panose="020B0604020202020204" pitchFamily="34" charset="0"/>
-              <a:buChar char="•"/>
-              <a:defRPr sz="2000" kern="1200">
-                <a:solidFill>
-                  <a:schemeClr val="tx1"/>
-                </a:solidFill>
-                <a:latin typeface="Technika" panose="00000600000000000000" pitchFamily="50" charset="-18"/>
-                <a:ea typeface="+mn-ea"/>
-                <a:cs typeface="+mn-cs"/>
-              </a:defRPr>
-            </a:lvl3pPr>
-            <a:lvl4pPr marL="1600120" indent="-228589" algn="l" defTabSz="914354" rtl="0" eaLnBrk="1" latinLnBrk="0" hangingPunct="1">
-              <a:lnSpc>
-                <a:spcPct val="90000"/>
-              </a:lnSpc>
-              <a:spcBef>
-                <a:spcPts val="500"/>
-              </a:spcBef>
-              <a:buFont typeface="Arial" panose="020B0604020202020204" pitchFamily="34" charset="0"/>
-              <a:buChar char="•"/>
-              <a:defRPr sz="1800" kern="1200">
-                <a:solidFill>
-                  <a:schemeClr val="tx1"/>
-                </a:solidFill>
-                <a:latin typeface="Technika" panose="00000600000000000000" pitchFamily="50" charset="-18"/>
-                <a:ea typeface="+mn-ea"/>
-                <a:cs typeface="+mn-cs"/>
-              </a:defRPr>
-            </a:lvl4pPr>
-            <a:lvl5pPr marL="2057298" indent="-228589" algn="l" defTabSz="914354" rtl="0" eaLnBrk="1" latinLnBrk="0" hangingPunct="1">
-              <a:lnSpc>
-                <a:spcPct val="90000"/>
-              </a:lnSpc>
-              <a:spcBef>
-                <a:spcPts val="500"/>
-              </a:spcBef>
-              <a:buFont typeface="Arial" panose="020B0604020202020204" pitchFamily="34" charset="0"/>
-              <a:buChar char="•"/>
-              <a:defRPr sz="1800" kern="1200">
-                <a:solidFill>
-                  <a:schemeClr val="tx1"/>
-                </a:solidFill>
-                <a:latin typeface="Technika" panose="00000600000000000000" pitchFamily="50" charset="-18"/>
-                <a:ea typeface="+mn-ea"/>
-                <a:cs typeface="+mn-cs"/>
-              </a:defRPr>
-            </a:lvl5pPr>
-            <a:lvl6pPr marL="2514474" indent="-228589" algn="l" defTabSz="914354" rtl="0" eaLnBrk="1" latinLnBrk="0" hangingPunct="1">
-              <a:lnSpc>
-                <a:spcPct val="90000"/>
-              </a:lnSpc>
-              <a:spcBef>
-                <a:spcPts val="500"/>
-              </a:spcBef>
-              <a:buFont typeface="Arial" panose="020B0604020202020204" pitchFamily="34" charset="0"/>
-              <a:buChar char="•"/>
-              <a:defRPr sz="1800" kern="1200">
-                <a:solidFill>
-                  <a:schemeClr val="tx1"/>
-                </a:solidFill>
-                <a:latin typeface="+mn-lt"/>
-                <a:ea typeface="+mn-ea"/>
-                <a:cs typeface="+mn-cs"/>
-              </a:defRPr>
-            </a:lvl6pPr>
-            <a:lvl7pPr marL="2971652" indent="-228589" algn="l" defTabSz="914354" rtl="0" eaLnBrk="1" latinLnBrk="0" hangingPunct="1">
-              <a:lnSpc>
-                <a:spcPct val="90000"/>
-              </a:lnSpc>
-              <a:spcBef>
-                <a:spcPts val="500"/>
-              </a:spcBef>
-              <a:buFont typeface="Arial" panose="020B0604020202020204" pitchFamily="34" charset="0"/>
-              <a:buChar char="•"/>
-              <a:defRPr sz="1800" kern="1200">
-                <a:solidFill>
-                  <a:schemeClr val="tx1"/>
-                </a:solidFill>
-                <a:latin typeface="+mn-lt"/>
-                <a:ea typeface="+mn-ea"/>
-                <a:cs typeface="+mn-cs"/>
-              </a:defRPr>
-            </a:lvl7pPr>
-            <a:lvl8pPr marL="3428829" indent="-228589" algn="l" defTabSz="914354" rtl="0" eaLnBrk="1" latinLnBrk="0" hangingPunct="1">
-              <a:lnSpc>
-                <a:spcPct val="90000"/>
-              </a:lnSpc>
-              <a:spcBef>
-                <a:spcPts val="500"/>
-              </a:spcBef>
-              <a:buFont typeface="Arial" panose="020B0604020202020204" pitchFamily="34" charset="0"/>
-              <a:buChar char="•"/>
-              <a:defRPr sz="1800" kern="1200">
-                <a:solidFill>
-                  <a:schemeClr val="tx1"/>
-                </a:solidFill>
-                <a:latin typeface="+mn-lt"/>
-                <a:ea typeface="+mn-ea"/>
-                <a:cs typeface="+mn-cs"/>
-              </a:defRPr>
-            </a:lvl8pPr>
-            <a:lvl9pPr marL="3886006" indent="-228589" algn="l" defTabSz="914354" rtl="0" eaLnBrk="1" latinLnBrk="0" hangingPunct="1">
-              <a:lnSpc>
-                <a:spcPct val="90000"/>
-              </a:lnSpc>
-              <a:spcBef>
-                <a:spcPts val="500"/>
-              </a:spcBef>
-              <a:buFont typeface="Arial" panose="020B0604020202020204" pitchFamily="34" charset="0"/>
-              <a:buChar char="•"/>
-              <a:defRPr sz="1800" kern="1200">
-                <a:solidFill>
-                  <a:schemeClr val="tx1"/>
-                </a:solidFill>
-                <a:latin typeface="+mn-lt"/>
-                <a:ea typeface="+mn-ea"/>
-                <a:cs typeface="+mn-cs"/>
-              </a:defRPr>
-            </a:lvl9pPr>
-          </a:lstStyle>
-          <a:p>
-            <a:pPr algn="ctr"/>
-            <a:r>
-              <a:rPr lang="en-CZ" sz="2400" dirty="0">
-                <a:latin typeface="Times New Roman" panose="02020603050405020304" pitchFamily="18" charset="0"/>
-                <a:cs typeface="Times New Roman" panose="02020603050405020304" pitchFamily="18" charset="0"/>
-              </a:rPr>
-              <a:t>Optimizováno pro změnu</a:t>
-            </a:r>
-          </a:p>
-          <a:p>
-            <a:pPr algn="ctr"/>
-            <a:r>
-              <a:rPr lang="en-CZ" sz="2400" dirty="0">
-                <a:latin typeface="Times New Roman" panose="02020603050405020304" pitchFamily="18" charset="0"/>
-                <a:cs typeface="Times New Roman" panose="02020603050405020304" pitchFamily="18" charset="0"/>
-              </a:rPr>
-              <a:t>Objektivně orientované, modulární architektura</a:t>
-            </a:r>
-          </a:p>
-          <a:p>
-            <a:pPr algn="ctr"/>
-            <a:r>
-              <a:rPr lang="en-CZ" sz="2400" dirty="0">
-                <a:latin typeface="Times New Roman" panose="02020603050405020304" pitchFamily="18" charset="0"/>
-                <a:cs typeface="Times New Roman" panose="02020603050405020304" pitchFamily="18" charset="0"/>
-              </a:rPr>
-              <a:t>Test Driven Development</a:t>
-            </a:r>
-          </a:p>
-          <a:p>
-            <a:pPr algn="ctr"/>
-            <a:r>
-              <a:rPr lang="en-CZ" sz="2400" dirty="0">
-                <a:latin typeface="Times New Roman" panose="02020603050405020304" pitchFamily="18" charset="0"/>
-                <a:cs typeface="Times New Roman" panose="02020603050405020304" pitchFamily="18" charset="0"/>
-              </a:rPr>
-              <a:t>Contact First Design</a:t>
-            </a:r>
-          </a:p>
-          <a:p>
-            <a:pPr algn="ctr"/>
-            <a:r>
-              <a:rPr lang="en-CZ" sz="2400" dirty="0">
-                <a:latin typeface="Times New Roman" panose="02020603050405020304" pitchFamily="18" charset="0"/>
-                <a:cs typeface="Times New Roman" panose="02020603050405020304" pitchFamily="18" charset="0"/>
-              </a:rPr>
-              <a:t>Iterate the Design</a:t>
-            </a:r>
-          </a:p>
-          <a:p>
-            <a:pPr algn="ctr"/>
-            <a:r>
-              <a:rPr lang="en-CZ" sz="2400" dirty="0">
-                <a:latin typeface="Times New Roman" panose="02020603050405020304" pitchFamily="18" charset="0"/>
-                <a:cs typeface="Times New Roman" panose="02020603050405020304" pitchFamily="18" charset="0"/>
-              </a:rPr>
-              <a:t>Agile Hardware Design Patterns</a:t>
-            </a:r>
-          </a:p>
-          <a:p>
-            <a:pPr algn="ctr"/>
-            <a:r>
-              <a:rPr lang="en-CZ" sz="2400" dirty="0">
-                <a:latin typeface="Times New Roman" panose="02020603050405020304" pitchFamily="18" charset="0"/>
-                <a:cs typeface="Times New Roman" panose="02020603050405020304" pitchFamily="18" charset="0"/>
-              </a:rPr>
-              <a:t>Continuous Integration Development</a:t>
-            </a:r>
-          </a:p>
-          <a:p>
-            <a:pPr algn="ctr"/>
-            <a:r>
-              <a:rPr lang="en-CZ" sz="2400" dirty="0">
-                <a:latin typeface="Times New Roman" panose="02020603050405020304" pitchFamily="18" charset="0"/>
-                <a:cs typeface="Times New Roman" panose="02020603050405020304" pitchFamily="18" charset="0"/>
-              </a:rPr>
-              <a:t>Continuous Deployment Development</a:t>
-            </a:r>
-          </a:p>
-          <a:p>
-            <a:pPr algn="ctr"/>
-            <a:r>
-              <a:rPr lang="en-CZ" sz="2400" dirty="0">
-                <a:latin typeface="Times New Roman" panose="02020603050405020304" pitchFamily="18" charset="0"/>
-                <a:cs typeface="Times New Roman" panose="02020603050405020304" pitchFamily="18" charset="0"/>
-              </a:rPr>
-              <a:t>Scaling Patterns</a:t>
-            </a:r>
-          </a:p>
-          <a:p>
-            <a:pPr algn="ctr"/>
-            <a:r>
-              <a:rPr lang="en-CZ" sz="2400" dirty="0">
-                <a:solidFill>
-                  <a:srgbClr val="0065BD"/>
-                </a:solidFill>
-                <a:latin typeface="Times New Roman" panose="02020603050405020304" pitchFamily="18" charset="0"/>
-                <a:cs typeface="Times New Roman" panose="02020603050405020304" pitchFamily="18" charset="0"/>
-              </a:rPr>
-              <a:t>Partner Patterns</a:t>
-            </a:r>
-          </a:p>
-        </p:txBody>
-      </p:sp>
-    </p:spTree>
-    <p:extLst>
-      <p:ext uri="{BB962C8B-B14F-4D97-AF65-F5344CB8AC3E}">
-        <p14:creationId xmlns:p14="http://schemas.microsoft.com/office/powerpoint/2010/main" val="3905668839"/>
-      </p:ext>
-    </p:extLst>
-  </p:cSld>
-  <p:clrMapOvr>
-    <a:masterClrMapping/>
-  </p:clrMapOvr>
-</p:sld>
-</file>
-
-<file path=ppt/slides/slide52.xml><?xml version="1.0" encoding="utf-8"?>
-<p:sld xmlns:a="http://schemas.openxmlformats.org/drawingml/2006/main" xmlns:r="http://schemas.openxmlformats.org/officeDocument/2006/relationships" xmlns:p="http://schemas.openxmlformats.org/presentationml/2006/main">
-  <p:cSld>
-    <p:spTree>
-      <p:nvGrpSpPr>
-        <p:cNvPr id="1" name=""/>
-        <p:cNvGrpSpPr/>
-        <p:nvPr/>
-      </p:nvGrpSpPr>
-      <p:grpSpPr>
-        <a:xfrm>
-          <a:off x="0" y="0"/>
-          <a:ext cx="0" cy="0"/>
-          <a:chOff x="0" y="0"/>
-          <a:chExt cx="0" cy="0"/>
-        </a:xfrm>
-      </p:grpSpPr>
-      <p:sp>
-        <p:nvSpPr>
-          <p:cNvPr id="7" name="Title 1">
-            <a:extLst>
-              <a:ext uri="{FF2B5EF4-FFF2-40B4-BE49-F238E27FC236}">
-                <a16:creationId xmlns:a16="http://schemas.microsoft.com/office/drawing/2014/main" id="{778F5AB8-30D0-2943-8A43-A6E04205B88F}"/>
-              </a:ext>
-            </a:extLst>
-          </p:cNvPr>
-          <p:cNvSpPr txBox="1">
-            <a:spLocks/>
-          </p:cNvSpPr>
-          <p:nvPr/>
-        </p:nvSpPr>
-        <p:spPr>
-          <a:xfrm>
-            <a:off x="8469000" y="19878"/>
-            <a:ext cx="907827" cy="544775"/>
-          </a:xfrm>
-          <a:prstGeom prst="rect">
-            <a:avLst/>
-          </a:prstGeom>
-        </p:spPr>
-        <p:txBody>
-          <a:bodyPr vert="horz" lIns="91440" tIns="45720" rIns="91440" bIns="45720" rtlCol="0" anchor="t">
-            <a:normAutofit/>
-          </a:bodyPr>
-          <a:lstStyle>
-            <a:lvl1pPr algn="l" defTabSz="914354" rtl="0" eaLnBrk="1" latinLnBrk="0" hangingPunct="1">
-              <a:lnSpc>
-                <a:spcPct val="90000"/>
-              </a:lnSpc>
-              <a:spcBef>
-                <a:spcPct val="0"/>
-              </a:spcBef>
-              <a:buNone/>
-              <a:defRPr sz="2800" kern="2800" baseline="0">
-                <a:solidFill>
-                  <a:schemeClr val="tx1"/>
-                </a:solidFill>
-                <a:latin typeface="Technika-Bold" panose="00000600000000000000" pitchFamily="50" charset="-18"/>
-                <a:ea typeface="+mj-ea"/>
-                <a:cs typeface="+mj-cs"/>
-              </a:defRPr>
-            </a:lvl1pPr>
-          </a:lstStyle>
-          <a:p>
-            <a:r>
-              <a:rPr lang="en-CZ" dirty="0"/>
-              <a:t>XM</a:t>
-            </a:r>
-          </a:p>
-        </p:txBody>
-      </p:sp>
-      <p:sp>
-        <p:nvSpPr>
           <p:cNvPr id="6" name="Content Placeholder 2">
             <a:extLst>
               <a:ext uri="{FF2B5EF4-FFF2-40B4-BE49-F238E27FC236}">
@@ -18657,6 +18257,302 @@
     <p:extLst>
       <p:ext uri="{BB962C8B-B14F-4D97-AF65-F5344CB8AC3E}">
         <p14:creationId xmlns:p14="http://schemas.microsoft.com/office/powerpoint/2010/main" val="350606253"/>
+      </p:ext>
+    </p:extLst>
+  </p:cSld>
+  <p:clrMapOvr>
+    <a:masterClrMapping/>
+  </p:clrMapOvr>
+</p:sld>
+</file>
+
+<file path=ppt/slides/slide52.xml><?xml version="1.0" encoding="utf-8"?>
+<p:sld xmlns:a="http://schemas.openxmlformats.org/drawingml/2006/main" xmlns:r="http://schemas.openxmlformats.org/officeDocument/2006/relationships" xmlns:p="http://schemas.openxmlformats.org/presentationml/2006/main">
+  <p:cSld>
+    <p:spTree>
+      <p:nvGrpSpPr>
+        <p:cNvPr id="1" name=""/>
+        <p:cNvGrpSpPr/>
+        <p:nvPr/>
+      </p:nvGrpSpPr>
+      <p:grpSpPr>
+        <a:xfrm>
+          <a:off x="0" y="0"/>
+          <a:ext cx="0" cy="0"/>
+          <a:chOff x="0" y="0"/>
+          <a:chExt cx="0" cy="0"/>
+        </a:xfrm>
+      </p:grpSpPr>
+      <p:sp>
+        <p:nvSpPr>
+          <p:cNvPr id="2" name="Title 1">
+            <a:extLst>
+              <a:ext uri="{FF2B5EF4-FFF2-40B4-BE49-F238E27FC236}">
+                <a16:creationId xmlns:a16="http://schemas.microsoft.com/office/drawing/2014/main" id="{28C9F81D-D815-C64B-B580-2F7E104BCCF8}"/>
+              </a:ext>
+            </a:extLst>
+          </p:cNvPr>
+          <p:cNvSpPr>
+            <a:spLocks noGrp="1"/>
+          </p:cNvSpPr>
+          <p:nvPr>
+            <p:ph type="ctrTitle"/>
+          </p:nvPr>
+        </p:nvSpPr>
+        <p:spPr>
+          <a:xfrm>
+            <a:off x="1080000" y="2705668"/>
+            <a:ext cx="7736694" cy="1446663"/>
+          </a:xfrm>
+        </p:spPr>
+        <p:txBody>
+          <a:bodyPr/>
+          <a:lstStyle/>
+          <a:p>
+            <a:r>
+              <a:rPr lang="en-CZ" dirty="0"/>
+              <a:t>Děkujeme za pozornost</a:t>
+            </a:r>
+          </a:p>
+        </p:txBody>
+      </p:sp>
+      <p:sp>
+        <p:nvSpPr>
+          <p:cNvPr id="4" name="Content Placeholder 2">
+            <a:extLst>
+              <a:ext uri="{FF2B5EF4-FFF2-40B4-BE49-F238E27FC236}">
+                <a16:creationId xmlns:a16="http://schemas.microsoft.com/office/drawing/2014/main" id="{0989FA9D-E085-184A-85E2-259E55750507}"/>
+              </a:ext>
+            </a:extLst>
+          </p:cNvPr>
+          <p:cNvSpPr txBox="1">
+            <a:spLocks/>
+          </p:cNvSpPr>
+          <p:nvPr/>
+        </p:nvSpPr>
+        <p:spPr>
+          <a:xfrm>
+            <a:off x="-457200" y="6272448"/>
+            <a:ext cx="10058400" cy="1481070"/>
+          </a:xfrm>
+          <a:prstGeom prst="rect">
+            <a:avLst/>
+          </a:prstGeom>
+        </p:spPr>
+        <p:txBody>
+          <a:bodyPr vert="horz" lIns="91440" tIns="45720" rIns="91440" bIns="45720" rtlCol="0">
+            <a:normAutofit/>
+          </a:bodyPr>
+          <a:lstStyle>
+            <a:lvl1pPr marL="0" indent="0" algn="l" defTabSz="914354" rtl="0" eaLnBrk="1" latinLnBrk="0" hangingPunct="1">
+              <a:lnSpc>
+                <a:spcPct val="90000"/>
+              </a:lnSpc>
+              <a:spcBef>
+                <a:spcPts val="1000"/>
+              </a:spcBef>
+              <a:buFont typeface="Arial" panose="020B0604020202020204" pitchFamily="34" charset="0"/>
+              <a:buNone/>
+              <a:defRPr sz="2000" kern="3000" baseline="0">
+                <a:solidFill>
+                  <a:schemeClr val="tx1"/>
+                </a:solidFill>
+                <a:latin typeface="Technika-Bold" panose="00000600000000000000" pitchFamily="50" charset="-18"/>
+                <a:ea typeface="+mn-ea"/>
+                <a:cs typeface="+mn-cs"/>
+              </a:defRPr>
+            </a:lvl1pPr>
+            <a:lvl2pPr marL="685766" indent="-228589" algn="l" defTabSz="914354" rtl="0" eaLnBrk="1" latinLnBrk="0" hangingPunct="1">
+              <a:lnSpc>
+                <a:spcPct val="90000"/>
+              </a:lnSpc>
+              <a:spcBef>
+                <a:spcPts val="500"/>
+              </a:spcBef>
+              <a:buFont typeface="Arial" panose="020B0604020202020204" pitchFamily="34" charset="0"/>
+              <a:buChar char="•"/>
+              <a:defRPr sz="2400" kern="1200">
+                <a:solidFill>
+                  <a:schemeClr val="tx1"/>
+                </a:solidFill>
+                <a:latin typeface="Technika" panose="00000600000000000000" pitchFamily="50" charset="-18"/>
+                <a:ea typeface="+mn-ea"/>
+                <a:cs typeface="+mn-cs"/>
+              </a:defRPr>
+            </a:lvl2pPr>
+            <a:lvl3pPr marL="1142942" indent="-228589" algn="l" defTabSz="914354" rtl="0" eaLnBrk="1" latinLnBrk="0" hangingPunct="1">
+              <a:lnSpc>
+                <a:spcPct val="90000"/>
+              </a:lnSpc>
+              <a:spcBef>
+                <a:spcPts val="500"/>
+              </a:spcBef>
+              <a:buFont typeface="Arial" panose="020B0604020202020204" pitchFamily="34" charset="0"/>
+              <a:buChar char="•"/>
+              <a:defRPr sz="2000" kern="1200">
+                <a:solidFill>
+                  <a:schemeClr val="tx1"/>
+                </a:solidFill>
+                <a:latin typeface="Technika" panose="00000600000000000000" pitchFamily="50" charset="-18"/>
+                <a:ea typeface="+mn-ea"/>
+                <a:cs typeface="+mn-cs"/>
+              </a:defRPr>
+            </a:lvl3pPr>
+            <a:lvl4pPr marL="1600120" indent="-228589" algn="l" defTabSz="914354" rtl="0" eaLnBrk="1" latinLnBrk="0" hangingPunct="1">
+              <a:lnSpc>
+                <a:spcPct val="90000"/>
+              </a:lnSpc>
+              <a:spcBef>
+                <a:spcPts val="500"/>
+              </a:spcBef>
+              <a:buFont typeface="Arial" panose="020B0604020202020204" pitchFamily="34" charset="0"/>
+              <a:buChar char="•"/>
+              <a:defRPr sz="1800" kern="1200">
+                <a:solidFill>
+                  <a:schemeClr val="tx1"/>
+                </a:solidFill>
+                <a:latin typeface="Technika" panose="00000600000000000000" pitchFamily="50" charset="-18"/>
+                <a:ea typeface="+mn-ea"/>
+                <a:cs typeface="+mn-cs"/>
+              </a:defRPr>
+            </a:lvl4pPr>
+            <a:lvl5pPr marL="2057298" indent="-228589" algn="l" defTabSz="914354" rtl="0" eaLnBrk="1" latinLnBrk="0" hangingPunct="1">
+              <a:lnSpc>
+                <a:spcPct val="90000"/>
+              </a:lnSpc>
+              <a:spcBef>
+                <a:spcPts val="500"/>
+              </a:spcBef>
+              <a:buFont typeface="Arial" panose="020B0604020202020204" pitchFamily="34" charset="0"/>
+              <a:buChar char="•"/>
+              <a:defRPr sz="1800" kern="1200">
+                <a:solidFill>
+                  <a:schemeClr val="tx1"/>
+                </a:solidFill>
+                <a:latin typeface="Technika" panose="00000600000000000000" pitchFamily="50" charset="-18"/>
+                <a:ea typeface="+mn-ea"/>
+                <a:cs typeface="+mn-cs"/>
+              </a:defRPr>
+            </a:lvl5pPr>
+            <a:lvl6pPr marL="2514474" indent="-228589" algn="l" defTabSz="914354" rtl="0" eaLnBrk="1" latinLnBrk="0" hangingPunct="1">
+              <a:lnSpc>
+                <a:spcPct val="90000"/>
+              </a:lnSpc>
+              <a:spcBef>
+                <a:spcPts val="500"/>
+              </a:spcBef>
+              <a:buFont typeface="Arial" panose="020B0604020202020204" pitchFamily="34" charset="0"/>
+              <a:buChar char="•"/>
+              <a:defRPr sz="1800" kern="1200">
+                <a:solidFill>
+                  <a:schemeClr val="tx1"/>
+                </a:solidFill>
+                <a:latin typeface="+mn-lt"/>
+                <a:ea typeface="+mn-ea"/>
+                <a:cs typeface="+mn-cs"/>
+              </a:defRPr>
+            </a:lvl6pPr>
+            <a:lvl7pPr marL="2971652" indent="-228589" algn="l" defTabSz="914354" rtl="0" eaLnBrk="1" latinLnBrk="0" hangingPunct="1">
+              <a:lnSpc>
+                <a:spcPct val="90000"/>
+              </a:lnSpc>
+              <a:spcBef>
+                <a:spcPts val="500"/>
+              </a:spcBef>
+              <a:buFont typeface="Arial" panose="020B0604020202020204" pitchFamily="34" charset="0"/>
+              <a:buChar char="•"/>
+              <a:defRPr sz="1800" kern="1200">
+                <a:solidFill>
+                  <a:schemeClr val="tx1"/>
+                </a:solidFill>
+                <a:latin typeface="+mn-lt"/>
+                <a:ea typeface="+mn-ea"/>
+                <a:cs typeface="+mn-cs"/>
+              </a:defRPr>
+            </a:lvl7pPr>
+            <a:lvl8pPr marL="3428829" indent="-228589" algn="l" defTabSz="914354" rtl="0" eaLnBrk="1" latinLnBrk="0" hangingPunct="1">
+              <a:lnSpc>
+                <a:spcPct val="90000"/>
+              </a:lnSpc>
+              <a:spcBef>
+                <a:spcPts val="500"/>
+              </a:spcBef>
+              <a:buFont typeface="Arial" panose="020B0604020202020204" pitchFamily="34" charset="0"/>
+              <a:buChar char="•"/>
+              <a:defRPr sz="1800" kern="1200">
+                <a:solidFill>
+                  <a:schemeClr val="tx1"/>
+                </a:solidFill>
+                <a:latin typeface="+mn-lt"/>
+                <a:ea typeface="+mn-ea"/>
+                <a:cs typeface="+mn-cs"/>
+              </a:defRPr>
+            </a:lvl8pPr>
+            <a:lvl9pPr marL="3886006" indent="-228589" algn="l" defTabSz="914354" rtl="0" eaLnBrk="1" latinLnBrk="0" hangingPunct="1">
+              <a:lnSpc>
+                <a:spcPct val="90000"/>
+              </a:lnSpc>
+              <a:spcBef>
+                <a:spcPts val="500"/>
+              </a:spcBef>
+              <a:buFont typeface="Arial" panose="020B0604020202020204" pitchFamily="34" charset="0"/>
+              <a:buChar char="•"/>
+              <a:defRPr sz="1800" kern="1200">
+                <a:solidFill>
+                  <a:schemeClr val="tx1"/>
+                </a:solidFill>
+                <a:latin typeface="+mn-lt"/>
+                <a:ea typeface="+mn-ea"/>
+                <a:cs typeface="+mn-cs"/>
+              </a:defRPr>
+            </a:lvl9pPr>
+          </a:lstStyle>
+          <a:p>
+            <a:pPr algn="ctr"/>
+            <a:r>
+              <a:rPr lang="cs-CZ" sz="2800" dirty="0" err="1">
+                <a:solidFill>
+                  <a:schemeClr val="bg1">
+                    <a:lumMod val="85000"/>
+                  </a:schemeClr>
+                </a:solidFill>
+              </a:rPr>
+              <a:t>ptzk.cz</a:t>
+            </a:r>
+            <a:r>
+              <a:rPr lang="cs-CZ" sz="2800" dirty="0">
+                <a:solidFill>
+                  <a:schemeClr val="bg1">
+                    <a:lumMod val="85000"/>
+                  </a:schemeClr>
+                </a:solidFill>
+              </a:rPr>
+              <a:t>/</a:t>
+            </a:r>
+            <a:r>
+              <a:rPr lang="cs-CZ" sz="2800" dirty="0" err="1">
+                <a:solidFill>
+                  <a:schemeClr val="bg1">
+                    <a:lumMod val="85000"/>
+                  </a:schemeClr>
+                </a:solidFill>
+              </a:rPr>
+              <a:t>tpr</a:t>
+            </a:r>
+            <a:endParaRPr lang="en-CZ" sz="2800" dirty="0">
+              <a:solidFill>
+                <a:schemeClr val="bg1">
+                  <a:lumMod val="85000"/>
+                </a:schemeClr>
+              </a:solidFill>
+            </a:endParaRPr>
+          </a:p>
+        </p:txBody>
+      </p:sp>
+    </p:spTree>
+    <p:extLst>
+      <p:ext uri="{BB962C8B-B14F-4D97-AF65-F5344CB8AC3E}">
+        <p14:creationId xmlns:p14="http://schemas.microsoft.com/office/powerpoint/2010/main" val="2323112200"/>
       </p:ext>
     </p:extLst>
   </p:cSld>

</xml_diff>